<commit_message>
Added datasheet for motor
</commit_message>
<xml_diff>
--- a/system_models/alfa_model/system_model schematic.pptx
+++ b/system_models/alfa_model/system_model schematic.pptx
@@ -6,7 +6,9 @@
   </p:sldMasterIdLst>
   <p:sldIdLst>
     <p:sldId id="256" r:id="rId2"/>
-    <p:sldId id="257" r:id="rId3"/>
+    <p:sldId id="258" r:id="rId3"/>
+    <p:sldId id="257" r:id="rId4"/>
+    <p:sldId id="259" r:id="rId5"/>
   </p:sldIdLst>
   <p:sldSz cx="12192000" cy="6858000"/>
   <p:notesSz cx="6858000" cy="9144000"/>
@@ -105,6 +107,11 @@
       </a:defRPr>
     </a:lvl9pPr>
   </p:defaultTextStyle>
+  <p:extLst>
+    <p:ext uri="{EFAFB233-063F-42B5-8137-9DF3F51BA10A}">
+      <p15:sldGuideLst xmlns:p15="http://schemas.microsoft.com/office/powerpoint/2012/main"/>
+    </p:ext>
+  </p:extLst>
 </p:presentation>
 </file>
 
@@ -257,7 +264,7 @@
           <a:p>
             <a:fld id="{10397C23-67FA-4C03-8034-1083DB446CA5}" type="datetimeFigureOut">
               <a:rPr lang="en-CA" smtClean="0"/>
-              <a:t>2022-02-15</a:t>
+              <a:t>2022-02-23</a:t>
             </a:fld>
             <a:endParaRPr lang="en-CA"/>
           </a:p>
@@ -457,7 +464,7 @@
           <a:p>
             <a:fld id="{10397C23-67FA-4C03-8034-1083DB446CA5}" type="datetimeFigureOut">
               <a:rPr lang="en-CA" smtClean="0"/>
-              <a:t>2022-02-15</a:t>
+              <a:t>2022-02-23</a:t>
             </a:fld>
             <a:endParaRPr lang="en-CA"/>
           </a:p>
@@ -667,7 +674,7 @@
           <a:p>
             <a:fld id="{10397C23-67FA-4C03-8034-1083DB446CA5}" type="datetimeFigureOut">
               <a:rPr lang="en-CA" smtClean="0"/>
-              <a:t>2022-02-15</a:t>
+              <a:t>2022-02-23</a:t>
             </a:fld>
             <a:endParaRPr lang="en-CA"/>
           </a:p>
@@ -867,7 +874,7 @@
           <a:p>
             <a:fld id="{10397C23-67FA-4C03-8034-1083DB446CA5}" type="datetimeFigureOut">
               <a:rPr lang="en-CA" smtClean="0"/>
-              <a:t>2022-02-15</a:t>
+              <a:t>2022-02-23</a:t>
             </a:fld>
             <a:endParaRPr lang="en-CA"/>
           </a:p>
@@ -1143,7 +1150,7 @@
           <a:p>
             <a:fld id="{10397C23-67FA-4C03-8034-1083DB446CA5}" type="datetimeFigureOut">
               <a:rPr lang="en-CA" smtClean="0"/>
-              <a:t>2022-02-15</a:t>
+              <a:t>2022-02-23</a:t>
             </a:fld>
             <a:endParaRPr lang="en-CA"/>
           </a:p>
@@ -1411,7 +1418,7 @@
           <a:p>
             <a:fld id="{10397C23-67FA-4C03-8034-1083DB446CA5}" type="datetimeFigureOut">
               <a:rPr lang="en-CA" smtClean="0"/>
-              <a:t>2022-02-15</a:t>
+              <a:t>2022-02-23</a:t>
             </a:fld>
             <a:endParaRPr lang="en-CA"/>
           </a:p>
@@ -1826,7 +1833,7 @@
           <a:p>
             <a:fld id="{10397C23-67FA-4C03-8034-1083DB446CA5}" type="datetimeFigureOut">
               <a:rPr lang="en-CA" smtClean="0"/>
-              <a:t>2022-02-15</a:t>
+              <a:t>2022-02-23</a:t>
             </a:fld>
             <a:endParaRPr lang="en-CA"/>
           </a:p>
@@ -1968,7 +1975,7 @@
           <a:p>
             <a:fld id="{10397C23-67FA-4C03-8034-1083DB446CA5}" type="datetimeFigureOut">
               <a:rPr lang="en-CA" smtClean="0"/>
-              <a:t>2022-02-15</a:t>
+              <a:t>2022-02-23</a:t>
             </a:fld>
             <a:endParaRPr lang="en-CA"/>
           </a:p>
@@ -2081,7 +2088,7 @@
           <a:p>
             <a:fld id="{10397C23-67FA-4C03-8034-1083DB446CA5}" type="datetimeFigureOut">
               <a:rPr lang="en-CA" smtClean="0"/>
-              <a:t>2022-02-15</a:t>
+              <a:t>2022-02-23</a:t>
             </a:fld>
             <a:endParaRPr lang="en-CA"/>
           </a:p>
@@ -2394,7 +2401,7 @@
           <a:p>
             <a:fld id="{10397C23-67FA-4C03-8034-1083DB446CA5}" type="datetimeFigureOut">
               <a:rPr lang="en-CA" smtClean="0"/>
-              <a:t>2022-02-15</a:t>
+              <a:t>2022-02-23</a:t>
             </a:fld>
             <a:endParaRPr lang="en-CA"/>
           </a:p>
@@ -2683,7 +2690,7 @@
           <a:p>
             <a:fld id="{10397C23-67FA-4C03-8034-1083DB446CA5}" type="datetimeFigureOut">
               <a:rPr lang="en-CA" smtClean="0"/>
-              <a:t>2022-02-15</a:t>
+              <a:t>2022-02-23</a:t>
             </a:fld>
             <a:endParaRPr lang="en-CA"/>
           </a:p>
@@ -2926,7 +2933,7 @@
           <a:p>
             <a:fld id="{10397C23-67FA-4C03-8034-1083DB446CA5}" type="datetimeFigureOut">
               <a:rPr lang="en-CA" smtClean="0"/>
-              <a:t>2022-02-15</a:t>
+              <a:t>2022-02-23</a:t>
             </a:fld>
             <a:endParaRPr lang="en-CA"/>
           </a:p>
@@ -3606,6 +3613,7 @@
               </a:bodyPr>
               <a:lstStyle/>
               <a:p>
+                <a:pPr/>
                 <a14:m>
                   <m:oMathPara xmlns:m="http://schemas.openxmlformats.org/officeDocument/2006/math">
                     <m:oMathParaPr>
@@ -3757,6 +3765,1025 @@
           </p:sp>
         </mc:Fallback>
       </mc:AlternateContent>
+      <mc:AlternateContent xmlns:mc="http://schemas.openxmlformats.org/markup-compatibility/2006" xmlns:a14="http://schemas.microsoft.com/office/drawing/2010/main">
+        <mc:Choice Requires="a14">
+          <p:sp>
+            <p:nvSpPr>
+              <p:cNvPr id="21" name="TextBox 20">
+                <a:extLst>
+                  <a:ext uri="{FF2B5EF4-FFF2-40B4-BE49-F238E27FC236}">
+                    <a16:creationId xmlns:a16="http://schemas.microsoft.com/office/drawing/2014/main" id="{60F59525-1DC5-4224-8078-EA1754900AFC}"/>
+                  </a:ext>
+                </a:extLst>
+              </p:cNvPr>
+              <p:cNvSpPr txBox="1"/>
+              <p:nvPr/>
+            </p:nvSpPr>
+            <p:spPr>
+              <a:xfrm>
+                <a:off x="2469289" y="2414325"/>
+                <a:ext cx="446725" cy="391902"/>
+              </a:xfrm>
+              <a:prstGeom prst="rect">
+                <a:avLst/>
+              </a:prstGeom>
+              <a:solidFill>
+                <a:schemeClr val="bg1"/>
+              </a:solidFill>
+              <a:ln>
+                <a:solidFill>
+                  <a:schemeClr val="tx1"/>
+                </a:solidFill>
+              </a:ln>
+            </p:spPr>
+            <p:txBody>
+              <a:bodyPr wrap="none" rtlCol="0">
+                <a:spAutoFit/>
+              </a:bodyPr>
+              <a:lstStyle/>
+              <a:p>
+                <a:pPr/>
+                <a14:m>
+                  <m:oMathPara xmlns:m="http://schemas.openxmlformats.org/officeDocument/2006/math">
+                    <m:oMathParaPr>
+                      <m:jc m:val="centerGroup"/>
+                    </m:oMathParaPr>
+                    <m:oMath xmlns:m="http://schemas.openxmlformats.org/officeDocument/2006/math">
+                      <m:sSub>
+                        <m:sSubPr>
+                          <m:ctrlPr>
+                            <a:rPr lang="en-CA" i="1" smtClean="0">
+                              <a:latin typeface="Cambria Math" panose="02040503050406030204" pitchFamily="18" charset="0"/>
+                            </a:rPr>
+                          </m:ctrlPr>
+                        </m:sSubPr>
+                        <m:e>
+                          <m:r>
+                            <a:rPr lang="en-CA" b="0" i="1" smtClean="0">
+                              <a:latin typeface="Cambria Math" panose="02040503050406030204" pitchFamily="18" charset="0"/>
+                            </a:rPr>
+                            <m:t>𝐹</m:t>
+                          </m:r>
+                        </m:e>
+                        <m:sub>
+                          <m:r>
+                            <a:rPr lang="en-CA" b="0" i="1" smtClean="0">
+                              <a:latin typeface="Cambria Math" panose="02040503050406030204" pitchFamily="18" charset="0"/>
+                            </a:rPr>
+                            <m:t>𝑔</m:t>
+                          </m:r>
+                        </m:sub>
+                      </m:sSub>
+                    </m:oMath>
+                  </m:oMathPara>
+                </a14:m>
+                <a:endParaRPr lang="en-CA" dirty="0"/>
+              </a:p>
+            </p:txBody>
+          </p:sp>
+        </mc:Choice>
+        <mc:Fallback xmlns="">
+          <p:sp>
+            <p:nvSpPr>
+              <p:cNvPr id="21" name="TextBox 20">
+                <a:extLst>
+                  <a:ext uri="{FF2B5EF4-FFF2-40B4-BE49-F238E27FC236}">
+                    <a16:creationId xmlns:a16="http://schemas.microsoft.com/office/drawing/2014/main" id="{60F59525-1DC5-4224-8078-EA1754900AFC}"/>
+                  </a:ext>
+                </a:extLst>
+              </p:cNvPr>
+              <p:cNvSpPr txBox="1">
+                <a:spLocks noRot="1" noChangeAspect="1" noMove="1" noResize="1" noEditPoints="1" noAdjustHandles="1" noChangeArrowheads="1" noChangeShapeType="1" noTextEdit="1"/>
+              </p:cNvSpPr>
+              <p:nvPr/>
+            </p:nvSpPr>
+            <p:spPr>
+              <a:xfrm>
+                <a:off x="2469289" y="2414325"/>
+                <a:ext cx="446725" cy="391902"/>
+              </a:xfrm>
+              <a:prstGeom prst="rect">
+                <a:avLst/>
+              </a:prstGeom>
+              <a:blipFill>
+                <a:blip r:embed="rId3"/>
+                <a:stretch>
+                  <a:fillRect b="-4545"/>
+                </a:stretch>
+              </a:blipFill>
+              <a:ln>
+                <a:solidFill>
+                  <a:schemeClr val="tx1"/>
+                </a:solidFill>
+              </a:ln>
+            </p:spPr>
+            <p:txBody>
+              <a:bodyPr/>
+              <a:lstStyle/>
+              <a:p>
+                <a:r>
+                  <a:rPr lang="en-CA">
+                    <a:noFill/>
+                  </a:rPr>
+                  <a:t> </a:t>
+                </a:r>
+              </a:p>
+            </p:txBody>
+          </p:sp>
+        </mc:Fallback>
+      </mc:AlternateContent>
+      <p:sp>
+        <p:nvSpPr>
+          <p:cNvPr id="22" name="Isosceles Triangle 21">
+            <a:extLst>
+              <a:ext uri="{FF2B5EF4-FFF2-40B4-BE49-F238E27FC236}">
+                <a16:creationId xmlns:a16="http://schemas.microsoft.com/office/drawing/2014/main" id="{AE2EF61A-2F52-4A21-A0CC-3AA625DEDCC1}"/>
+              </a:ext>
+            </a:extLst>
+          </p:cNvPr>
+          <p:cNvSpPr/>
+          <p:nvPr/>
+        </p:nvSpPr>
+        <p:spPr>
+          <a:xfrm>
+            <a:off x="2205981" y="4442270"/>
+            <a:ext cx="293196" cy="218934"/>
+          </a:xfrm>
+          <a:prstGeom prst="triangle">
+            <a:avLst/>
+          </a:prstGeom>
+          <a:solidFill>
+            <a:schemeClr val="bg1"/>
+          </a:solidFill>
+        </p:spPr>
+        <p:style>
+          <a:lnRef idx="2">
+            <a:schemeClr val="accent1">
+              <a:shade val="50000"/>
+            </a:schemeClr>
+          </a:lnRef>
+          <a:fillRef idx="1">
+            <a:schemeClr val="accent1"/>
+          </a:fillRef>
+          <a:effectRef idx="0">
+            <a:schemeClr val="accent1"/>
+          </a:effectRef>
+          <a:fontRef idx="minor">
+            <a:schemeClr val="lt1"/>
+          </a:fontRef>
+        </p:style>
+        <p:txBody>
+          <a:bodyPr rtlCol="0" anchor="ctr"/>
+          <a:lstStyle/>
+          <a:p>
+            <a:pPr algn="ctr"/>
+            <a:endParaRPr lang="en-CA"/>
+          </a:p>
+        </p:txBody>
+      </p:sp>
+      <p:sp>
+        <p:nvSpPr>
+          <p:cNvPr id="23" name="Isosceles Triangle 22">
+            <a:extLst>
+              <a:ext uri="{FF2B5EF4-FFF2-40B4-BE49-F238E27FC236}">
+                <a16:creationId xmlns:a16="http://schemas.microsoft.com/office/drawing/2014/main" id="{297AFB81-A002-4EE2-B869-F944C2AF36DD}"/>
+              </a:ext>
+            </a:extLst>
+          </p:cNvPr>
+          <p:cNvSpPr/>
+          <p:nvPr/>
+        </p:nvSpPr>
+        <p:spPr>
+          <a:xfrm rot="10800000">
+            <a:off x="2189785" y="4091362"/>
+            <a:ext cx="293196" cy="284920"/>
+          </a:xfrm>
+          <a:prstGeom prst="triangle">
+            <a:avLst/>
+          </a:prstGeom>
+          <a:solidFill>
+            <a:schemeClr val="bg1"/>
+          </a:solidFill>
+        </p:spPr>
+        <p:style>
+          <a:lnRef idx="2">
+            <a:schemeClr val="accent1">
+              <a:shade val="50000"/>
+            </a:schemeClr>
+          </a:lnRef>
+          <a:fillRef idx="1">
+            <a:schemeClr val="accent1"/>
+          </a:fillRef>
+          <a:effectRef idx="0">
+            <a:schemeClr val="accent1"/>
+          </a:effectRef>
+          <a:fontRef idx="minor">
+            <a:schemeClr val="lt1"/>
+          </a:fontRef>
+        </p:style>
+        <p:txBody>
+          <a:bodyPr rtlCol="0" anchor="ctr"/>
+          <a:lstStyle/>
+          <a:p>
+            <a:pPr algn="ctr"/>
+            <a:endParaRPr lang="en-CA"/>
+          </a:p>
+        </p:txBody>
+      </p:sp>
+      <p:sp>
+        <p:nvSpPr>
+          <p:cNvPr id="24" name="Isosceles Triangle 23">
+            <a:extLst>
+              <a:ext uri="{FF2B5EF4-FFF2-40B4-BE49-F238E27FC236}">
+                <a16:creationId xmlns:a16="http://schemas.microsoft.com/office/drawing/2014/main" id="{61B540A2-F7AB-46AF-B2B0-C6185DF03B0B}"/>
+              </a:ext>
+            </a:extLst>
+          </p:cNvPr>
+          <p:cNvSpPr/>
+          <p:nvPr/>
+        </p:nvSpPr>
+        <p:spPr>
+          <a:xfrm rot="16200000">
+            <a:off x="2468751" y="4178895"/>
+            <a:ext cx="293196" cy="452487"/>
+          </a:xfrm>
+          <a:prstGeom prst="triangle">
+            <a:avLst/>
+          </a:prstGeom>
+          <a:solidFill>
+            <a:schemeClr val="bg1"/>
+          </a:solidFill>
+        </p:spPr>
+        <p:style>
+          <a:lnRef idx="2">
+            <a:schemeClr val="accent1">
+              <a:shade val="50000"/>
+            </a:schemeClr>
+          </a:lnRef>
+          <a:fillRef idx="1">
+            <a:schemeClr val="accent1"/>
+          </a:fillRef>
+          <a:effectRef idx="0">
+            <a:schemeClr val="accent1"/>
+          </a:effectRef>
+          <a:fontRef idx="minor">
+            <a:schemeClr val="lt1"/>
+          </a:fontRef>
+        </p:style>
+        <p:txBody>
+          <a:bodyPr rtlCol="0" anchor="ctr"/>
+          <a:lstStyle/>
+          <a:p>
+            <a:pPr algn="ctr"/>
+            <a:endParaRPr lang="en-CA"/>
+          </a:p>
+        </p:txBody>
+      </p:sp>
+      <p:sp>
+        <p:nvSpPr>
+          <p:cNvPr id="25" name="Isosceles Triangle 24">
+            <a:extLst>
+              <a:ext uri="{FF2B5EF4-FFF2-40B4-BE49-F238E27FC236}">
+                <a16:creationId xmlns:a16="http://schemas.microsoft.com/office/drawing/2014/main" id="{6C375F75-9450-40A4-BB3F-32D5AF7981DB}"/>
+              </a:ext>
+            </a:extLst>
+          </p:cNvPr>
+          <p:cNvSpPr/>
+          <p:nvPr/>
+        </p:nvSpPr>
+        <p:spPr>
+          <a:xfrm rot="5400000">
+            <a:off x="1941842" y="4178895"/>
+            <a:ext cx="293196" cy="452487"/>
+          </a:xfrm>
+          <a:prstGeom prst="triangle">
+            <a:avLst/>
+          </a:prstGeom>
+          <a:solidFill>
+            <a:schemeClr val="bg1"/>
+          </a:solidFill>
+        </p:spPr>
+        <p:style>
+          <a:lnRef idx="2">
+            <a:schemeClr val="accent1">
+              <a:shade val="50000"/>
+            </a:schemeClr>
+          </a:lnRef>
+          <a:fillRef idx="1">
+            <a:schemeClr val="accent1"/>
+          </a:fillRef>
+          <a:effectRef idx="0">
+            <a:schemeClr val="accent1"/>
+          </a:effectRef>
+          <a:fontRef idx="minor">
+            <a:schemeClr val="lt1"/>
+          </a:fontRef>
+        </p:style>
+        <p:txBody>
+          <a:bodyPr rtlCol="0" anchor="ctr"/>
+          <a:lstStyle/>
+          <a:p>
+            <a:pPr algn="ctr"/>
+            <a:endParaRPr lang="en-CA"/>
+          </a:p>
+        </p:txBody>
+      </p:sp>
+      <p:sp>
+        <p:nvSpPr>
+          <p:cNvPr id="26" name="TextBox 25">
+            <a:extLst>
+              <a:ext uri="{FF2B5EF4-FFF2-40B4-BE49-F238E27FC236}">
+                <a16:creationId xmlns:a16="http://schemas.microsoft.com/office/drawing/2014/main" id="{743555CD-378F-460D-98BE-F90A4F225A12}"/>
+              </a:ext>
+            </a:extLst>
+          </p:cNvPr>
+          <p:cNvSpPr txBox="1"/>
+          <p:nvPr/>
+        </p:nvSpPr>
+        <p:spPr>
+          <a:xfrm>
+            <a:off x="2088440" y="4709825"/>
+            <a:ext cx="546277" cy="369332"/>
+          </a:xfrm>
+          <a:prstGeom prst="rect">
+            <a:avLst/>
+          </a:prstGeom>
+          <a:solidFill>
+            <a:schemeClr val="bg1"/>
+          </a:solidFill>
+          <a:ln>
+            <a:solidFill>
+              <a:schemeClr val="tx1"/>
+            </a:solidFill>
+          </a:ln>
+        </p:spPr>
+        <p:txBody>
+          <a:bodyPr wrap="square" rtlCol="0">
+            <a:spAutoFit/>
+          </a:bodyPr>
+          <a:lstStyle/>
+          <a:p>
+            <a:r>
+              <a:rPr lang="en-CA" dirty="0"/>
+              <a:t>fan</a:t>
+            </a:r>
+          </a:p>
+        </p:txBody>
+      </p:sp>
+      <p:sp>
+        <p:nvSpPr>
+          <p:cNvPr id="31" name="TextBox 30">
+            <a:extLst>
+              <a:ext uri="{FF2B5EF4-FFF2-40B4-BE49-F238E27FC236}">
+                <a16:creationId xmlns:a16="http://schemas.microsoft.com/office/drawing/2014/main" id="{113F4FB2-D7E7-42EB-95F5-7CFBD796B1CC}"/>
+              </a:ext>
+            </a:extLst>
+          </p:cNvPr>
+          <p:cNvSpPr txBox="1"/>
+          <p:nvPr/>
+        </p:nvSpPr>
+        <p:spPr>
+          <a:xfrm>
+            <a:off x="2065070" y="3445499"/>
+            <a:ext cx="648069" cy="369332"/>
+          </a:xfrm>
+          <a:prstGeom prst="rect">
+            <a:avLst/>
+          </a:prstGeom>
+          <a:solidFill>
+            <a:schemeClr val="bg1"/>
+          </a:solidFill>
+          <a:ln>
+            <a:solidFill>
+              <a:schemeClr val="tx1"/>
+            </a:solidFill>
+          </a:ln>
+        </p:spPr>
+        <p:txBody>
+          <a:bodyPr wrap="square" rtlCol="0">
+            <a:spAutoFit/>
+          </a:bodyPr>
+          <a:lstStyle/>
+          <a:p>
+            <a:r>
+              <a:rPr lang="en-CA" dirty="0"/>
+              <a:t>tube</a:t>
+            </a:r>
+          </a:p>
+        </p:txBody>
+      </p:sp>
+      <p:sp>
+        <p:nvSpPr>
+          <p:cNvPr id="32" name="TextBox 31">
+            <a:extLst>
+              <a:ext uri="{FF2B5EF4-FFF2-40B4-BE49-F238E27FC236}">
+                <a16:creationId xmlns:a16="http://schemas.microsoft.com/office/drawing/2014/main" id="{0520F17B-07D5-428B-A603-AEDF6BF136F9}"/>
+              </a:ext>
+            </a:extLst>
+          </p:cNvPr>
+          <p:cNvSpPr txBox="1"/>
+          <p:nvPr/>
+        </p:nvSpPr>
+        <p:spPr>
+          <a:xfrm>
+            <a:off x="2054356" y="1688823"/>
+            <a:ext cx="564051" cy="369332"/>
+          </a:xfrm>
+          <a:prstGeom prst="rect">
+            <a:avLst/>
+          </a:prstGeom>
+          <a:solidFill>
+            <a:schemeClr val="bg1"/>
+          </a:solidFill>
+          <a:ln>
+            <a:noFill/>
+          </a:ln>
+        </p:spPr>
+        <p:txBody>
+          <a:bodyPr wrap="square" rtlCol="0">
+            <a:spAutoFit/>
+          </a:bodyPr>
+          <a:lstStyle/>
+          <a:p>
+            <a:r>
+              <a:rPr lang="en-CA" dirty="0"/>
+              <a:t>ball</a:t>
+            </a:r>
+          </a:p>
+        </p:txBody>
+      </p:sp>
+      <p:cxnSp>
+        <p:nvCxnSpPr>
+          <p:cNvPr id="33" name="Straight Arrow Connector 32">
+            <a:extLst>
+              <a:ext uri="{FF2B5EF4-FFF2-40B4-BE49-F238E27FC236}">
+                <a16:creationId xmlns:a16="http://schemas.microsoft.com/office/drawing/2014/main" id="{E3FBD5D7-5832-4498-9ECC-420DC86CEA54}"/>
+              </a:ext>
+            </a:extLst>
+          </p:cNvPr>
+          <p:cNvCxnSpPr>
+            <a:cxnSpLocks/>
+          </p:cNvCxnSpPr>
+          <p:nvPr/>
+        </p:nvCxnSpPr>
+        <p:spPr>
+          <a:xfrm flipV="1">
+            <a:off x="1147439" y="532336"/>
+            <a:ext cx="0" cy="904974"/>
+          </a:xfrm>
+          <a:prstGeom prst="straightConnector1">
+            <a:avLst/>
+          </a:prstGeom>
+          <a:ln w="19050">
+            <a:solidFill>
+              <a:schemeClr val="tx1"/>
+            </a:solidFill>
+            <a:tailEnd type="triangle"/>
+          </a:ln>
+        </p:spPr>
+        <p:style>
+          <a:lnRef idx="1">
+            <a:schemeClr val="accent1"/>
+          </a:lnRef>
+          <a:fillRef idx="0">
+            <a:schemeClr val="accent1"/>
+          </a:fillRef>
+          <a:effectRef idx="0">
+            <a:schemeClr val="accent1"/>
+          </a:effectRef>
+          <a:fontRef idx="minor">
+            <a:schemeClr val="tx1"/>
+          </a:fontRef>
+        </p:style>
+      </p:cxnSp>
+      <mc:AlternateContent xmlns:mc="http://schemas.openxmlformats.org/markup-compatibility/2006" xmlns:a14="http://schemas.microsoft.com/office/drawing/2010/main">
+        <mc:Choice Requires="a14">
+          <p:sp>
+            <p:nvSpPr>
+              <p:cNvPr id="34" name="TextBox 33">
+                <a:extLst>
+                  <a:ext uri="{FF2B5EF4-FFF2-40B4-BE49-F238E27FC236}">
+                    <a16:creationId xmlns:a16="http://schemas.microsoft.com/office/drawing/2014/main" id="{442143F9-3B61-4BC9-8EFF-C2DB94FBD20F}"/>
+                  </a:ext>
+                </a:extLst>
+              </p:cNvPr>
+              <p:cNvSpPr txBox="1"/>
+              <p:nvPr/>
+            </p:nvSpPr>
+            <p:spPr>
+              <a:xfrm>
+                <a:off x="355601" y="532336"/>
+                <a:ext cx="595804" cy="369332"/>
+              </a:xfrm>
+              <a:prstGeom prst="rect">
+                <a:avLst/>
+              </a:prstGeom>
+              <a:solidFill>
+                <a:schemeClr val="bg1"/>
+              </a:solidFill>
+              <a:ln>
+                <a:solidFill>
+                  <a:schemeClr val="tx1"/>
+                </a:solidFill>
+              </a:ln>
+            </p:spPr>
+            <p:txBody>
+              <a:bodyPr wrap="none" rtlCol="0">
+                <a:spAutoFit/>
+              </a:bodyPr>
+              <a:lstStyle/>
+              <a:p>
+                <a:pPr/>
+                <a14:m>
+                  <m:oMathPara xmlns:m="http://schemas.openxmlformats.org/officeDocument/2006/math">
+                    <m:oMathParaPr>
+                      <m:jc m:val="centerGroup"/>
+                    </m:oMathParaPr>
+                    <m:oMath xmlns:m="http://schemas.openxmlformats.org/officeDocument/2006/math">
+                      <m:r>
+                        <a:rPr lang="en-CA" i="1" smtClean="0">
+                          <a:latin typeface="Cambria Math" panose="02040503050406030204" pitchFamily="18" charset="0"/>
+                        </a:rPr>
+                        <m:t>𝑦</m:t>
+                      </m:r>
+                      <m:r>
+                        <a:rPr lang="en-CA" b="0" i="1" smtClean="0">
+                          <a:latin typeface="Cambria Math" panose="02040503050406030204" pitchFamily="18" charset="0"/>
+                        </a:rPr>
+                        <m:t>+</m:t>
+                      </m:r>
+                    </m:oMath>
+                  </m:oMathPara>
+                </a14:m>
+                <a:endParaRPr lang="en-CA" dirty="0"/>
+              </a:p>
+            </p:txBody>
+          </p:sp>
+        </mc:Choice>
+        <mc:Fallback xmlns="">
+          <p:sp>
+            <p:nvSpPr>
+              <p:cNvPr id="34" name="TextBox 33">
+                <a:extLst>
+                  <a:ext uri="{FF2B5EF4-FFF2-40B4-BE49-F238E27FC236}">
+                    <a16:creationId xmlns:a16="http://schemas.microsoft.com/office/drawing/2014/main" id="{442143F9-3B61-4BC9-8EFF-C2DB94FBD20F}"/>
+                  </a:ext>
+                </a:extLst>
+              </p:cNvPr>
+              <p:cNvSpPr txBox="1">
+                <a:spLocks noRot="1" noChangeAspect="1" noMove="1" noResize="1" noEditPoints="1" noAdjustHandles="1" noChangeArrowheads="1" noChangeShapeType="1" noTextEdit="1"/>
+              </p:cNvSpPr>
+              <p:nvPr/>
+            </p:nvSpPr>
+            <p:spPr>
+              <a:xfrm>
+                <a:off x="355601" y="532336"/>
+                <a:ext cx="595804" cy="369332"/>
+              </a:xfrm>
+              <a:prstGeom prst="rect">
+                <a:avLst/>
+              </a:prstGeom>
+              <a:blipFill>
+                <a:blip r:embed="rId4"/>
+                <a:stretch>
+                  <a:fillRect b="-4762"/>
+                </a:stretch>
+              </a:blipFill>
+              <a:ln>
+                <a:solidFill>
+                  <a:schemeClr val="tx1"/>
+                </a:solidFill>
+              </a:ln>
+            </p:spPr>
+            <p:txBody>
+              <a:bodyPr/>
+              <a:lstStyle/>
+              <a:p>
+                <a:r>
+                  <a:rPr lang="en-CA">
+                    <a:noFill/>
+                  </a:rPr>
+                  <a:t> </a:t>
+                </a:r>
+              </a:p>
+            </p:txBody>
+          </p:sp>
+        </mc:Fallback>
+      </mc:AlternateContent>
+    </p:spTree>
+    <p:extLst>
+      <p:ext uri="{BB962C8B-B14F-4D97-AF65-F5344CB8AC3E}">
+        <p14:creationId xmlns:p14="http://schemas.microsoft.com/office/powerpoint/2010/main" val="355517839"/>
+      </p:ext>
+    </p:extLst>
+  </p:cSld>
+  <p:clrMapOvr>
+    <a:masterClrMapping/>
+  </p:clrMapOvr>
+</p:sld>
+</file>
+
+<file path=ppt/slides/slide2.xml><?xml version="1.0" encoding="utf-8"?>
+<p:sld xmlns:a="http://schemas.openxmlformats.org/drawingml/2006/main" xmlns:r="http://schemas.openxmlformats.org/officeDocument/2006/relationships" xmlns:p="http://schemas.openxmlformats.org/presentationml/2006/main">
+  <p:cSld>
+    <p:spTree>
+      <p:nvGrpSpPr>
+        <p:cNvPr id="1" name=""/>
+        <p:cNvGrpSpPr/>
+        <p:nvPr/>
+      </p:nvGrpSpPr>
+      <p:grpSpPr>
+        <a:xfrm>
+          <a:off x="0" y="0"/>
+          <a:ext cx="0" cy="0"/>
+          <a:chOff x="0" y="0"/>
+          <a:chExt cx="0" cy="0"/>
+        </a:xfrm>
+      </p:grpSpPr>
+      <p:cxnSp>
+        <p:nvCxnSpPr>
+          <p:cNvPr id="6" name="Straight Connector 5">
+            <a:extLst>
+              <a:ext uri="{FF2B5EF4-FFF2-40B4-BE49-F238E27FC236}">
+                <a16:creationId xmlns:a16="http://schemas.microsoft.com/office/drawing/2014/main" id="{A48497CC-CC6B-4452-998B-4F29FB3512E3}"/>
+              </a:ext>
+            </a:extLst>
+          </p:cNvPr>
+          <p:cNvCxnSpPr>
+            <a:cxnSpLocks/>
+          </p:cNvCxnSpPr>
+          <p:nvPr/>
+        </p:nvCxnSpPr>
+        <p:spPr>
+          <a:xfrm>
+            <a:off x="1609879" y="499369"/>
+            <a:ext cx="0" cy="3888419"/>
+          </a:xfrm>
+          <a:prstGeom prst="line">
+            <a:avLst/>
+          </a:prstGeom>
+          <a:ln w="28575">
+            <a:solidFill>
+              <a:schemeClr val="tx1"/>
+            </a:solidFill>
+          </a:ln>
+        </p:spPr>
+        <p:style>
+          <a:lnRef idx="1">
+            <a:schemeClr val="accent1"/>
+          </a:lnRef>
+          <a:fillRef idx="0">
+            <a:schemeClr val="accent1"/>
+          </a:fillRef>
+          <a:effectRef idx="0">
+            <a:schemeClr val="accent1"/>
+          </a:effectRef>
+          <a:fontRef idx="minor">
+            <a:schemeClr val="tx1"/>
+          </a:fontRef>
+        </p:style>
+      </p:cxnSp>
+      <p:cxnSp>
+        <p:nvCxnSpPr>
+          <p:cNvPr id="8" name="Straight Connector 7">
+            <a:extLst>
+              <a:ext uri="{FF2B5EF4-FFF2-40B4-BE49-F238E27FC236}">
+                <a16:creationId xmlns:a16="http://schemas.microsoft.com/office/drawing/2014/main" id="{644B82E0-5387-4721-8DBD-8EB08D7F2485}"/>
+              </a:ext>
+            </a:extLst>
+          </p:cNvPr>
+          <p:cNvCxnSpPr>
+            <a:cxnSpLocks/>
+          </p:cNvCxnSpPr>
+          <p:nvPr/>
+        </p:nvCxnSpPr>
+        <p:spPr>
+          <a:xfrm>
+            <a:off x="2997190" y="499369"/>
+            <a:ext cx="0" cy="3888419"/>
+          </a:xfrm>
+          <a:prstGeom prst="line">
+            <a:avLst/>
+          </a:prstGeom>
+          <a:ln w="28575">
+            <a:solidFill>
+              <a:schemeClr val="tx1"/>
+            </a:solidFill>
+          </a:ln>
+        </p:spPr>
+        <p:style>
+          <a:lnRef idx="1">
+            <a:schemeClr val="accent1"/>
+          </a:lnRef>
+          <a:fillRef idx="0">
+            <a:schemeClr val="accent1"/>
+          </a:fillRef>
+          <a:effectRef idx="0">
+            <a:schemeClr val="accent1"/>
+          </a:effectRef>
+          <a:fontRef idx="minor">
+            <a:schemeClr val="tx1"/>
+          </a:fontRef>
+        </p:style>
+      </p:cxnSp>
+      <p:sp>
+        <p:nvSpPr>
+          <p:cNvPr id="11" name="Oval 10">
+            <a:extLst>
+              <a:ext uri="{FF2B5EF4-FFF2-40B4-BE49-F238E27FC236}">
+                <a16:creationId xmlns:a16="http://schemas.microsoft.com/office/drawing/2014/main" id="{31305B01-BA5E-4F20-A78A-9D4C4245B103}"/>
+              </a:ext>
+            </a:extLst>
+          </p:cNvPr>
+          <p:cNvSpPr/>
+          <p:nvPr/>
+        </p:nvSpPr>
+        <p:spPr>
+          <a:xfrm>
+            <a:off x="1906437" y="1530735"/>
+            <a:ext cx="805196" cy="707010"/>
+          </a:xfrm>
+          <a:prstGeom prst="ellipse">
+            <a:avLst/>
+          </a:prstGeom>
+          <a:noFill/>
+          <a:ln w="19050">
+            <a:solidFill>
+              <a:schemeClr val="tx1"/>
+            </a:solidFill>
+          </a:ln>
+        </p:spPr>
+        <p:style>
+          <a:lnRef idx="2">
+            <a:schemeClr val="accent1">
+              <a:shade val="50000"/>
+            </a:schemeClr>
+          </a:lnRef>
+          <a:fillRef idx="1">
+            <a:schemeClr val="accent1"/>
+          </a:fillRef>
+          <a:effectRef idx="0">
+            <a:schemeClr val="accent1"/>
+          </a:effectRef>
+          <a:fontRef idx="minor">
+            <a:schemeClr val="lt1"/>
+          </a:fontRef>
+        </p:style>
+        <p:txBody>
+          <a:bodyPr rtlCol="0" anchor="ctr"/>
+          <a:lstStyle/>
+          <a:p>
+            <a:pPr algn="ctr"/>
+            <a:endParaRPr lang="en-CA"/>
+          </a:p>
+        </p:txBody>
+      </p:sp>
+      <p:cxnSp>
+        <p:nvCxnSpPr>
+          <p:cNvPr id="13" name="Straight Arrow Connector 12">
+            <a:extLst>
+              <a:ext uri="{FF2B5EF4-FFF2-40B4-BE49-F238E27FC236}">
+                <a16:creationId xmlns:a16="http://schemas.microsoft.com/office/drawing/2014/main" id="{292A61B9-389E-42BB-943D-0153F16E1C6F}"/>
+              </a:ext>
+            </a:extLst>
+          </p:cNvPr>
+          <p:cNvCxnSpPr>
+            <a:cxnSpLocks/>
+          </p:cNvCxnSpPr>
+          <p:nvPr/>
+        </p:nvCxnSpPr>
+        <p:spPr>
+          <a:xfrm flipV="1">
+            <a:off x="2309035" y="625761"/>
+            <a:ext cx="0" cy="904974"/>
+          </a:xfrm>
+          <a:prstGeom prst="straightConnector1">
+            <a:avLst/>
+          </a:prstGeom>
+          <a:ln w="19050">
+            <a:solidFill>
+              <a:schemeClr val="tx1"/>
+            </a:solidFill>
+            <a:tailEnd type="triangle"/>
+          </a:ln>
+        </p:spPr>
+        <p:style>
+          <a:lnRef idx="1">
+            <a:schemeClr val="accent1"/>
+          </a:lnRef>
+          <a:fillRef idx="0">
+            <a:schemeClr val="accent1"/>
+          </a:fillRef>
+          <a:effectRef idx="0">
+            <a:schemeClr val="accent1"/>
+          </a:effectRef>
+          <a:fontRef idx="minor">
+            <a:schemeClr val="tx1"/>
+          </a:fontRef>
+        </p:style>
+      </p:cxnSp>
+      <p:cxnSp>
+        <p:nvCxnSpPr>
+          <p:cNvPr id="14" name="Straight Arrow Connector 13">
+            <a:extLst>
+              <a:ext uri="{FF2B5EF4-FFF2-40B4-BE49-F238E27FC236}">
+                <a16:creationId xmlns:a16="http://schemas.microsoft.com/office/drawing/2014/main" id="{8677D36F-BA35-4AE3-BBA1-236F586A1833}"/>
+              </a:ext>
+            </a:extLst>
+          </p:cNvPr>
+          <p:cNvCxnSpPr>
+            <a:cxnSpLocks/>
+          </p:cNvCxnSpPr>
+          <p:nvPr/>
+        </p:nvCxnSpPr>
+        <p:spPr>
+          <a:xfrm>
+            <a:off x="2309035" y="2237745"/>
+            <a:ext cx="0" cy="1018094"/>
+          </a:xfrm>
+          <a:prstGeom prst="straightConnector1">
+            <a:avLst/>
+          </a:prstGeom>
+          <a:ln w="19050">
+            <a:solidFill>
+              <a:schemeClr val="tx1"/>
+            </a:solidFill>
+            <a:tailEnd type="triangle"/>
+          </a:ln>
+        </p:spPr>
+        <p:style>
+          <a:lnRef idx="1">
+            <a:schemeClr val="accent1"/>
+          </a:lnRef>
+          <a:fillRef idx="0">
+            <a:schemeClr val="accent1"/>
+          </a:fillRef>
+          <a:effectRef idx="0">
+            <a:schemeClr val="accent1"/>
+          </a:effectRef>
+          <a:fontRef idx="minor">
+            <a:schemeClr val="tx1"/>
+          </a:fontRef>
+        </p:style>
+      </p:cxnSp>
+      <mc:AlternateContent xmlns:mc="http://schemas.openxmlformats.org/markup-compatibility/2006">
+        <mc:Choice xmlns:a14="http://schemas.microsoft.com/office/drawing/2010/main" Requires="a14">
+          <p:sp>
+            <p:nvSpPr>
+              <p:cNvPr id="20" name="TextBox 19">
+                <a:extLst>
+                  <a:ext uri="{FF2B5EF4-FFF2-40B4-BE49-F238E27FC236}">
+                    <a16:creationId xmlns:a16="http://schemas.microsoft.com/office/drawing/2014/main" id="{A3D57A3B-7EC4-4BE1-8BFB-45A6A4CD8ABD}"/>
+                  </a:ext>
+                </a:extLst>
+              </p:cNvPr>
+              <p:cNvSpPr txBox="1"/>
+              <p:nvPr/>
+            </p:nvSpPr>
+            <p:spPr>
+              <a:xfrm>
+                <a:off x="2469289" y="800157"/>
+                <a:ext cx="982192" cy="369332"/>
+              </a:xfrm>
+              <a:prstGeom prst="rect">
+                <a:avLst/>
+              </a:prstGeom>
+              <a:solidFill>
+                <a:schemeClr val="bg1"/>
+              </a:solidFill>
+              <a:ln>
+                <a:solidFill>
+                  <a:schemeClr val="tx1"/>
+                </a:solidFill>
+              </a:ln>
+            </p:spPr>
+            <p:txBody>
+              <a:bodyPr wrap="none" rtlCol="0">
+                <a:spAutoFit/>
+              </a:bodyPr>
+              <a:lstStyle/>
+              <a:p>
+                <a:pPr/>
+                <a14:m>
+                  <m:oMathPara xmlns:m="http://schemas.openxmlformats.org/officeDocument/2006/math">
+                    <m:oMathParaPr>
+                      <m:jc m:val="centerGroup"/>
+                    </m:oMathParaPr>
+                    <m:oMath xmlns:m="http://schemas.openxmlformats.org/officeDocument/2006/math">
+                      <m:sSub>
+                        <m:sSubPr>
+                          <m:ctrlPr>
+                            <a:rPr lang="en-CA" i="1" smtClean="0">
+                              <a:latin typeface="Cambria Math" panose="02040503050406030204" pitchFamily="18" charset="0"/>
+                            </a:rPr>
+                          </m:ctrlPr>
+                        </m:sSubPr>
+                        <m:e>
+                          <m:r>
+                            <a:rPr lang="en-CA" b="0" i="1" smtClean="0">
+                              <a:latin typeface="Cambria Math" panose="02040503050406030204" pitchFamily="18" charset="0"/>
+                            </a:rPr>
+                            <m:t>𝐹</m:t>
+                          </m:r>
+                        </m:e>
+                        <m:sub>
+                          <m:r>
+                            <a:rPr lang="en-CA" b="0" i="1" smtClean="0">
+                              <a:latin typeface="Cambria Math" panose="02040503050406030204" pitchFamily="18" charset="0"/>
+                            </a:rPr>
+                            <m:t>𝑑</m:t>
+                          </m:r>
+                        </m:sub>
+                      </m:sSub>
+                      <m:r>
+                        <a:rPr lang="en-CA" b="0" i="1" smtClean="0">
+                          <a:latin typeface="Cambria Math" panose="02040503050406030204" pitchFamily="18" charset="0"/>
+                        </a:rPr>
+                        <m:t>+</m:t>
+                      </m:r>
+                      <m:sSub>
+                        <m:sSubPr>
+                          <m:ctrlPr>
+                            <a:rPr lang="en-CA" i="1" smtClean="0">
+                              <a:latin typeface="Cambria Math" panose="02040503050406030204" pitchFamily="18" charset="0"/>
+                            </a:rPr>
+                          </m:ctrlPr>
+                        </m:sSubPr>
+                        <m:e>
+                          <m:r>
+                            <a:rPr lang="en-CA" b="0" i="1" smtClean="0">
+                              <a:latin typeface="Cambria Math" panose="02040503050406030204" pitchFamily="18" charset="0"/>
+                            </a:rPr>
+                            <m:t>𝐹</m:t>
+                          </m:r>
+                        </m:e>
+                        <m:sub>
+                          <m:r>
+                            <a:rPr lang="en-CA" b="0" i="1" smtClean="0">
+                              <a:latin typeface="Cambria Math" panose="02040503050406030204" pitchFamily="18" charset="0"/>
+                            </a:rPr>
+                            <m:t>𝑏</m:t>
+                          </m:r>
+                        </m:sub>
+                      </m:sSub>
+                    </m:oMath>
+                  </m:oMathPara>
+                </a14:m>
+                <a:endParaRPr lang="en-CA" dirty="0"/>
+              </a:p>
+            </p:txBody>
+          </p:sp>
+        </mc:Choice>
+        <mc:Fallback>
+          <p:sp>
+            <p:nvSpPr>
+              <p:cNvPr id="20" name="TextBox 19">
+                <a:extLst>
+                  <a:ext uri="{FF2B5EF4-FFF2-40B4-BE49-F238E27FC236}">
+                    <a16:creationId xmlns:a16="http://schemas.microsoft.com/office/drawing/2014/main" id="{A3D57A3B-7EC4-4BE1-8BFB-45A6A4CD8ABD}"/>
+                  </a:ext>
+                </a:extLst>
+              </p:cNvPr>
+              <p:cNvSpPr txBox="1">
+                <a:spLocks noRot="1" noChangeAspect="1" noMove="1" noResize="1" noEditPoints="1" noAdjustHandles="1" noChangeArrowheads="1" noChangeShapeType="1" noTextEdit="1"/>
+              </p:cNvSpPr>
+              <p:nvPr/>
+            </p:nvSpPr>
+            <p:spPr>
+              <a:xfrm>
+                <a:off x="2469289" y="800157"/>
+                <a:ext cx="982192" cy="369332"/>
+              </a:xfrm>
+              <a:prstGeom prst="rect">
+                <a:avLst/>
+              </a:prstGeom>
+              <a:blipFill>
+                <a:blip r:embed="rId2"/>
+                <a:stretch>
+                  <a:fillRect/>
+                </a:stretch>
+              </a:blipFill>
+              <a:ln>
+                <a:solidFill>
+                  <a:schemeClr val="tx1"/>
+                </a:solidFill>
+              </a:ln>
+            </p:spPr>
+            <p:txBody>
+              <a:bodyPr/>
+              <a:lstStyle/>
+              <a:p>
+                <a:r>
+                  <a:rPr lang="en-CA">
+                    <a:noFill/>
+                  </a:rPr>
+                  <a:t> </a:t>
+                </a:r>
+              </a:p>
+            </p:txBody>
+          </p:sp>
+        </mc:Fallback>
+      </mc:AlternateContent>
       <mc:AlternateContent xmlns:mc="http://schemas.openxmlformats.org/markup-compatibility/2006">
         <mc:Choice xmlns:a14="http://schemas.microsoft.com/office/drawing/2010/main" Requires="a14">
           <p:sp>
@@ -3794,6 +4821,7 @@
               </a:bodyPr>
               <a:lstStyle/>
               <a:p>
+                <a:pPr/>
                 <a14:m>
                   <m:oMathPara xmlns:m="http://schemas.openxmlformats.org/officeDocument/2006/math">
                     <m:oMathParaPr>
@@ -4284,6 +5312,7 @@
               </a:bodyPr>
               <a:lstStyle/>
               <a:p>
+                <a:pPr/>
                 <a14:m>
                   <m:oMathPara xmlns:m="http://schemas.openxmlformats.org/officeDocument/2006/math">
                     <m:oMathParaPr>
@@ -4363,7 +5392,7 @@
     </p:spTree>
     <p:extLst>
       <p:ext uri="{BB962C8B-B14F-4D97-AF65-F5344CB8AC3E}">
-        <p14:creationId xmlns:p14="http://schemas.microsoft.com/office/powerpoint/2010/main" val="355517839"/>
+        <p14:creationId xmlns:p14="http://schemas.microsoft.com/office/powerpoint/2010/main" val="3692801391"/>
       </p:ext>
     </p:extLst>
   </p:cSld>
@@ -4373,7 +5402,7 @@
 </p:sld>
 </file>
 
-<file path=ppt/slides/slide2.xml><?xml version="1.0" encoding="utf-8"?>
+<file path=ppt/slides/slide3.xml><?xml version="1.0" encoding="utf-8"?>
 <p:sld xmlns:a="http://schemas.openxmlformats.org/drawingml/2006/main" xmlns:r="http://schemas.openxmlformats.org/officeDocument/2006/relationships" xmlns:p="http://schemas.openxmlformats.org/presentationml/2006/main">
   <p:cSld>
     <p:spTree>
@@ -4390,8 +5419,8 @@
           <a:chExt cx="0" cy="0"/>
         </a:xfrm>
       </p:grpSpPr>
-      <mc:AlternateContent xmlns:mc="http://schemas.openxmlformats.org/markup-compatibility/2006">
-        <mc:Choice xmlns:a14="http://schemas.microsoft.com/office/drawing/2010/main" Requires="a14">
+      <mc:AlternateContent xmlns:mc="http://schemas.openxmlformats.org/markup-compatibility/2006" xmlns:a14="http://schemas.microsoft.com/office/drawing/2010/main">
+        <mc:Choice Requires="a14">
           <p:sp>
             <p:nvSpPr>
               <p:cNvPr id="4" name="TextBox 3">
@@ -4433,6 +5462,7 @@
                 </a:r>
               </a:p>
               <a:p>
+                <a:pPr/>
                 <a14:m>
                   <m:oMathPara xmlns:m="http://schemas.openxmlformats.org/officeDocument/2006/math">
                     <m:oMathParaPr>
@@ -4484,7 +5514,7 @@
             </p:txBody>
           </p:sp>
         </mc:Choice>
-        <mc:Fallback>
+        <mc:Fallback xmlns="">
           <p:sp>
             <p:nvSpPr>
               <p:cNvPr id="4" name="TextBox 3">
@@ -4619,6 +5649,7 @@
                 </a:r>
               </a:p>
               <a:p>
+                <a:pPr/>
                 <a14:m>
                   <m:oMathPara xmlns:m="http://schemas.openxmlformats.org/officeDocument/2006/math">
                     <m:oMathParaPr>
@@ -4720,8 +5751,8 @@
           </p:sp>
         </mc:Fallback>
       </mc:AlternateContent>
-      <mc:AlternateContent xmlns:mc="http://schemas.openxmlformats.org/markup-compatibility/2006">
-        <mc:Choice xmlns:a14="http://schemas.microsoft.com/office/drawing/2010/main" Requires="a14">
+      <mc:AlternateContent xmlns:mc="http://schemas.openxmlformats.org/markup-compatibility/2006" xmlns:a14="http://schemas.microsoft.com/office/drawing/2010/main">
+        <mc:Choice Requires="a14">
           <p:sp>
             <p:nvSpPr>
               <p:cNvPr id="7" name="TextBox 6">
@@ -4819,7 +5850,7 @@
             </p:txBody>
           </p:sp>
         </mc:Choice>
-        <mc:Fallback>
+        <mc:Fallback xmlns="">
           <p:sp>
             <p:nvSpPr>
               <p:cNvPr id="7" name="TextBox 6">
@@ -4959,8 +5990,8 @@
           </a:p>
         </p:txBody>
       </p:sp>
-      <mc:AlternateContent xmlns:mc="http://schemas.openxmlformats.org/markup-compatibility/2006">
-        <mc:Choice xmlns:a14="http://schemas.microsoft.com/office/drawing/2010/main" Requires="a14">
+      <mc:AlternateContent xmlns:mc="http://schemas.openxmlformats.org/markup-compatibility/2006" xmlns:a14="http://schemas.microsoft.com/office/drawing/2010/main">
+        <mc:Choice Requires="a14">
           <p:sp>
             <p:nvSpPr>
               <p:cNvPr id="10" name="TextBox 9">
@@ -4996,6 +6027,7 @@
               </a:bodyPr>
               <a:lstStyle/>
               <a:p>
+                <a:pPr/>
                 <a14:m>
                   <m:oMathPara xmlns:m="http://schemas.openxmlformats.org/officeDocument/2006/math">
                     <m:oMathParaPr>
@@ -5052,7 +6084,7 @@
             </p:txBody>
           </p:sp>
         </mc:Choice>
-        <mc:Fallback>
+        <mc:Fallback xmlns="">
           <p:sp>
             <p:nvSpPr>
               <p:cNvPr id="10" name="TextBox 9">
@@ -5429,6 +6461,710 @@
     <p:extLst>
       <p:ext uri="{BB962C8B-B14F-4D97-AF65-F5344CB8AC3E}">
         <p14:creationId xmlns:p14="http://schemas.microsoft.com/office/powerpoint/2010/main" val="4032437554"/>
+      </p:ext>
+    </p:extLst>
+  </p:cSld>
+  <p:clrMapOvr>
+    <a:masterClrMapping/>
+  </p:clrMapOvr>
+</p:sld>
+</file>
+
+<file path=ppt/slides/slide4.xml><?xml version="1.0" encoding="utf-8"?>
+<p:sld xmlns:a="http://schemas.openxmlformats.org/drawingml/2006/main" xmlns:r="http://schemas.openxmlformats.org/officeDocument/2006/relationships" xmlns:p="http://schemas.openxmlformats.org/presentationml/2006/main">
+  <p:cSld>
+    <p:spTree>
+      <p:nvGrpSpPr>
+        <p:cNvPr id="1" name=""/>
+        <p:cNvGrpSpPr/>
+        <p:nvPr/>
+      </p:nvGrpSpPr>
+      <p:grpSpPr>
+        <a:xfrm>
+          <a:off x="0" y="0"/>
+          <a:ext cx="0" cy="0"/>
+          <a:chOff x="0" y="0"/>
+          <a:chExt cx="0" cy="0"/>
+        </a:xfrm>
+      </p:grpSpPr>
+      <mc:AlternateContent xmlns:mc="http://schemas.openxmlformats.org/markup-compatibility/2006" xmlns:a14="http://schemas.microsoft.com/office/drawing/2010/main">
+        <mc:Choice Requires="a14">
+          <p:sp>
+            <p:nvSpPr>
+              <p:cNvPr id="4" name="TextBox 3">
+                <a:extLst>
+                  <a:ext uri="{FF2B5EF4-FFF2-40B4-BE49-F238E27FC236}">
+                    <a16:creationId xmlns:a16="http://schemas.microsoft.com/office/drawing/2014/main" id="{A4C22EE4-4E1A-4FA8-BA9F-442A999735E8}"/>
+                  </a:ext>
+                </a:extLst>
+              </p:cNvPr>
+              <p:cNvSpPr txBox="1"/>
+              <p:nvPr/>
+            </p:nvSpPr>
+            <p:spPr>
+              <a:xfrm>
+                <a:off x="555553" y="1427213"/>
+                <a:ext cx="1374928" cy="523220"/>
+              </a:xfrm>
+              <a:prstGeom prst="rect">
+                <a:avLst/>
+              </a:prstGeom>
+              <a:solidFill>
+                <a:schemeClr val="bg1"/>
+              </a:solidFill>
+              <a:ln>
+                <a:solidFill>
+                  <a:schemeClr val="tx1"/>
+                </a:solidFill>
+              </a:ln>
+            </p:spPr>
+            <p:txBody>
+              <a:bodyPr wrap="none" rtlCol="0">
+                <a:spAutoFit/>
+              </a:bodyPr>
+              <a:lstStyle/>
+              <a:p>
+                <a:r>
+                  <a:rPr lang="en-CA" sz="1400" dirty="0"/>
+                  <a:t>Desired position</a:t>
+                </a:r>
+              </a:p>
+              <a:p>
+                <a:pPr/>
+                <a14:m>
+                  <m:oMathPara xmlns:m="http://schemas.openxmlformats.org/officeDocument/2006/math">
+                    <m:oMathParaPr>
+                      <m:jc m:val="centerGroup"/>
+                    </m:oMathParaPr>
+                    <m:oMath xmlns:m="http://schemas.openxmlformats.org/officeDocument/2006/math">
+                      <m:r>
+                        <a:rPr lang="en-CA" sz="1400" b="0" i="1" smtClean="0">
+                          <a:latin typeface="Cambria Math" panose="02040503050406030204" pitchFamily="18" charset="0"/>
+                        </a:rPr>
+                        <m:t>(</m:t>
+                      </m:r>
+                      <m:sSub>
+                        <m:sSubPr>
+                          <m:ctrlPr>
+                            <a:rPr lang="en-CA" sz="1400" b="0" i="1" smtClean="0">
+                              <a:latin typeface="Cambria Math" panose="02040503050406030204" pitchFamily="18" charset="0"/>
+                            </a:rPr>
+                          </m:ctrlPr>
+                        </m:sSubPr>
+                        <m:e>
+                          <m:r>
+                            <a:rPr lang="en-CA" sz="1400" b="0" i="1" smtClean="0">
+                              <a:latin typeface="Cambria Math" panose="02040503050406030204" pitchFamily="18" charset="0"/>
+                            </a:rPr>
+                            <m:t>𝑦</m:t>
+                          </m:r>
+                        </m:e>
+                        <m:sub>
+                          <m:r>
+                            <a:rPr lang="en-CA" sz="1400" b="0" i="1" smtClean="0">
+                              <a:latin typeface="Cambria Math" panose="02040503050406030204" pitchFamily="18" charset="0"/>
+                            </a:rPr>
+                            <m:t>𝑖𝑛</m:t>
+                          </m:r>
+                        </m:sub>
+                      </m:sSub>
+                      <m:r>
+                        <a:rPr lang="en-CA" sz="1400" b="0" i="1" smtClean="0">
+                          <a:latin typeface="Cambria Math" panose="02040503050406030204" pitchFamily="18" charset="0"/>
+                        </a:rPr>
+                        <m:t>)</m:t>
+                      </m:r>
+                    </m:oMath>
+                  </m:oMathPara>
+                </a14:m>
+                <a:endParaRPr lang="en-CA" sz="1400" dirty="0"/>
+              </a:p>
+            </p:txBody>
+          </p:sp>
+        </mc:Choice>
+        <mc:Fallback xmlns="">
+          <p:sp>
+            <p:nvSpPr>
+              <p:cNvPr id="4" name="TextBox 3">
+                <a:extLst>
+                  <a:ext uri="{FF2B5EF4-FFF2-40B4-BE49-F238E27FC236}">
+                    <a16:creationId xmlns:a16="http://schemas.microsoft.com/office/drawing/2014/main" id="{A4C22EE4-4E1A-4FA8-BA9F-442A999735E8}"/>
+                  </a:ext>
+                </a:extLst>
+              </p:cNvPr>
+              <p:cNvSpPr txBox="1">
+                <a:spLocks noRot="1" noChangeAspect="1" noMove="1" noResize="1" noEditPoints="1" noAdjustHandles="1" noChangeArrowheads="1" noChangeShapeType="1" noTextEdit="1"/>
+              </p:cNvSpPr>
+              <p:nvPr/>
+            </p:nvSpPr>
+            <p:spPr>
+              <a:xfrm>
+                <a:off x="555553" y="1427213"/>
+                <a:ext cx="1374928" cy="523220"/>
+              </a:xfrm>
+              <a:prstGeom prst="rect">
+                <a:avLst/>
+              </a:prstGeom>
+              <a:blipFill>
+                <a:blip r:embed="rId2"/>
+                <a:stretch>
+                  <a:fillRect l="-877" t="-1136" b="-2273"/>
+                </a:stretch>
+              </a:blipFill>
+              <a:ln>
+                <a:solidFill>
+                  <a:schemeClr val="tx1"/>
+                </a:solidFill>
+              </a:ln>
+            </p:spPr>
+            <p:txBody>
+              <a:bodyPr/>
+              <a:lstStyle/>
+              <a:p>
+                <a:r>
+                  <a:rPr lang="en-CA">
+                    <a:noFill/>
+                  </a:rPr>
+                  <a:t> </a:t>
+                </a:r>
+              </a:p>
+            </p:txBody>
+          </p:sp>
+        </mc:Fallback>
+      </mc:AlternateContent>
+      <p:sp>
+        <p:nvSpPr>
+          <p:cNvPr id="5" name="TextBox 4">
+            <a:extLst>
+              <a:ext uri="{FF2B5EF4-FFF2-40B4-BE49-F238E27FC236}">
+                <a16:creationId xmlns:a16="http://schemas.microsoft.com/office/drawing/2014/main" id="{20179FEB-8274-4F37-AD8F-24F3BA1116D9}"/>
+              </a:ext>
+            </a:extLst>
+          </p:cNvPr>
+          <p:cNvSpPr txBox="1"/>
+          <p:nvPr/>
+        </p:nvSpPr>
+        <p:spPr>
+          <a:xfrm>
+            <a:off x="2389562" y="1529001"/>
+            <a:ext cx="896784" cy="307777"/>
+          </a:xfrm>
+          <a:prstGeom prst="rect">
+            <a:avLst/>
+          </a:prstGeom>
+          <a:solidFill>
+            <a:schemeClr val="bg1"/>
+          </a:solidFill>
+          <a:ln>
+            <a:solidFill>
+              <a:schemeClr val="tx1"/>
+            </a:solidFill>
+          </a:ln>
+        </p:spPr>
+        <p:txBody>
+          <a:bodyPr wrap="none" rtlCol="0">
+            <a:spAutoFit/>
+          </a:bodyPr>
+          <a:lstStyle/>
+          <a:p>
+            <a:r>
+              <a:rPr lang="en-CA" sz="1400" dirty="0"/>
+              <a:t>controller</a:t>
+            </a:r>
+          </a:p>
+        </p:txBody>
+      </p:sp>
+      <p:sp>
+        <p:nvSpPr>
+          <p:cNvPr id="6" name="TextBox 5">
+            <a:extLst>
+              <a:ext uri="{FF2B5EF4-FFF2-40B4-BE49-F238E27FC236}">
+                <a16:creationId xmlns:a16="http://schemas.microsoft.com/office/drawing/2014/main" id="{06FC168D-0EEC-4A3A-997F-8EA0DC9CBAFC}"/>
+              </a:ext>
+            </a:extLst>
+          </p:cNvPr>
+          <p:cNvSpPr txBox="1"/>
+          <p:nvPr/>
+        </p:nvSpPr>
+        <p:spPr>
+          <a:xfrm>
+            <a:off x="3810652" y="1529001"/>
+            <a:ext cx="607350" cy="307777"/>
+          </a:xfrm>
+          <a:prstGeom prst="rect">
+            <a:avLst/>
+          </a:prstGeom>
+          <a:solidFill>
+            <a:schemeClr val="bg1"/>
+          </a:solidFill>
+          <a:ln>
+            <a:solidFill>
+              <a:schemeClr val="tx1"/>
+            </a:solidFill>
+          </a:ln>
+        </p:spPr>
+        <p:txBody>
+          <a:bodyPr wrap="square" rtlCol="0">
+            <a:spAutoFit/>
+          </a:bodyPr>
+          <a:lstStyle/>
+          <a:p>
+            <a:r>
+              <a:rPr lang="en-CA" sz="1400" dirty="0"/>
+              <a:t>Fan</a:t>
+            </a:r>
+          </a:p>
+        </p:txBody>
+      </p:sp>
+      <p:sp>
+        <p:nvSpPr>
+          <p:cNvPr id="8" name="TextBox 7">
+            <a:extLst>
+              <a:ext uri="{FF2B5EF4-FFF2-40B4-BE49-F238E27FC236}">
+                <a16:creationId xmlns:a16="http://schemas.microsoft.com/office/drawing/2014/main" id="{F3E20832-5977-47AF-85B9-629A50E8EA5A}"/>
+              </a:ext>
+            </a:extLst>
+          </p:cNvPr>
+          <p:cNvSpPr txBox="1"/>
+          <p:nvPr/>
+        </p:nvSpPr>
+        <p:spPr>
+          <a:xfrm>
+            <a:off x="4945873" y="1427213"/>
+            <a:ext cx="888385" cy="523220"/>
+          </a:xfrm>
+          <a:prstGeom prst="rect">
+            <a:avLst/>
+          </a:prstGeom>
+          <a:solidFill>
+            <a:schemeClr val="bg1"/>
+          </a:solidFill>
+          <a:ln>
+            <a:solidFill>
+              <a:schemeClr val="tx1"/>
+            </a:solidFill>
+          </a:ln>
+        </p:spPr>
+        <p:txBody>
+          <a:bodyPr wrap="none" rtlCol="0">
+            <a:spAutoFit/>
+          </a:bodyPr>
+          <a:lstStyle/>
+          <a:p>
+            <a:r>
+              <a:rPr lang="en-CA" sz="1400" dirty="0"/>
+              <a:t>System</a:t>
+            </a:r>
+          </a:p>
+          <a:p>
+            <a:r>
+              <a:rPr lang="en-CA" sz="1400" dirty="0"/>
+              <a:t>Dynamics</a:t>
+            </a:r>
+          </a:p>
+        </p:txBody>
+      </p:sp>
+      <mc:AlternateContent xmlns:mc="http://schemas.openxmlformats.org/markup-compatibility/2006">
+        <mc:Choice xmlns:a14="http://schemas.microsoft.com/office/drawing/2010/main" Requires="a14">
+          <p:sp>
+            <p:nvSpPr>
+              <p:cNvPr id="10" name="TextBox 9">
+                <a:extLst>
+                  <a:ext uri="{FF2B5EF4-FFF2-40B4-BE49-F238E27FC236}">
+                    <a16:creationId xmlns:a16="http://schemas.microsoft.com/office/drawing/2014/main" id="{935FC2DD-CF19-47FC-BFCA-7D800665944B}"/>
+                  </a:ext>
+                </a:extLst>
+              </p:cNvPr>
+              <p:cNvSpPr txBox="1"/>
+              <p:nvPr/>
+            </p:nvSpPr>
+            <p:spPr>
+              <a:xfrm>
+                <a:off x="6469301" y="1529001"/>
+                <a:ext cx="1171346" cy="307777"/>
+              </a:xfrm>
+              <a:prstGeom prst="rect">
+                <a:avLst/>
+              </a:prstGeom>
+              <a:solidFill>
+                <a:schemeClr val="bg1"/>
+              </a:solidFill>
+              <a:ln>
+                <a:solidFill>
+                  <a:schemeClr val="tx1"/>
+                </a:solidFill>
+              </a:ln>
+            </p:spPr>
+            <p:txBody>
+              <a:bodyPr wrap="none" rtlCol="0">
+                <a:spAutoFit/>
+              </a:bodyPr>
+              <a:lstStyle/>
+              <a:p>
+                <a:r>
+                  <a:rPr lang="en-CA" sz="1400" dirty="0"/>
+                  <a:t>Output </a:t>
+                </a:r>
+                <a14:m>
+                  <m:oMath xmlns:m="http://schemas.openxmlformats.org/officeDocument/2006/math">
+                    <m:r>
+                      <a:rPr lang="en-CA" sz="1400" b="0" i="1" smtClean="0">
+                        <a:latin typeface="Cambria Math" panose="02040503050406030204" pitchFamily="18" charset="0"/>
+                      </a:rPr>
+                      <m:t>(</m:t>
+                    </m:r>
+                    <m:r>
+                      <a:rPr lang="en-CA" sz="1400" b="0" i="1" smtClean="0">
+                        <a:latin typeface="Cambria Math" panose="02040503050406030204" pitchFamily="18" charset="0"/>
+                      </a:rPr>
+                      <m:t>𝑦</m:t>
+                    </m:r>
+                    <m:r>
+                      <a:rPr lang="en-CA" sz="1400" b="0" i="1" smtClean="0">
+                        <a:latin typeface="Cambria Math" panose="02040503050406030204" pitchFamily="18" charset="0"/>
+                      </a:rPr>
+                      <m:t>, </m:t>
+                    </m:r>
+                    <m:acc>
+                      <m:accPr>
+                        <m:chr m:val="̇"/>
+                        <m:ctrlPr>
+                          <a:rPr lang="en-CA" sz="1400" b="0" i="1" smtClean="0">
+                            <a:latin typeface="Cambria Math" panose="02040503050406030204" pitchFamily="18" charset="0"/>
+                          </a:rPr>
+                        </m:ctrlPr>
+                      </m:accPr>
+                      <m:e>
+                        <m:r>
+                          <a:rPr lang="en-CA" sz="1400" b="0" i="1" smtClean="0">
+                            <a:latin typeface="Cambria Math" panose="02040503050406030204" pitchFamily="18" charset="0"/>
+                          </a:rPr>
+                          <m:t>𝑦</m:t>
+                        </m:r>
+                      </m:e>
+                    </m:acc>
+                    <m:r>
+                      <a:rPr lang="en-CA" sz="1400" b="0" i="1" smtClean="0">
+                        <a:latin typeface="Cambria Math" panose="02040503050406030204" pitchFamily="18" charset="0"/>
+                      </a:rPr>
+                      <m:t>)</m:t>
+                    </m:r>
+                  </m:oMath>
+                </a14:m>
+                <a:endParaRPr lang="en-CA" sz="1400" dirty="0"/>
+              </a:p>
+            </p:txBody>
+          </p:sp>
+        </mc:Choice>
+        <mc:Fallback>
+          <p:sp>
+            <p:nvSpPr>
+              <p:cNvPr id="10" name="TextBox 9">
+                <a:extLst>
+                  <a:ext uri="{FF2B5EF4-FFF2-40B4-BE49-F238E27FC236}">
+                    <a16:creationId xmlns:a16="http://schemas.microsoft.com/office/drawing/2014/main" id="{935FC2DD-CF19-47FC-BFCA-7D800665944B}"/>
+                  </a:ext>
+                </a:extLst>
+              </p:cNvPr>
+              <p:cNvSpPr txBox="1">
+                <a:spLocks noRot="1" noChangeAspect="1" noMove="1" noResize="1" noEditPoints="1" noAdjustHandles="1" noChangeArrowheads="1" noChangeShapeType="1" noTextEdit="1"/>
+              </p:cNvSpPr>
+              <p:nvPr/>
+            </p:nvSpPr>
+            <p:spPr>
+              <a:xfrm>
+                <a:off x="6469301" y="1529001"/>
+                <a:ext cx="1171346" cy="307777"/>
+              </a:xfrm>
+              <a:prstGeom prst="rect">
+                <a:avLst/>
+              </a:prstGeom>
+              <a:blipFill>
+                <a:blip r:embed="rId3"/>
+                <a:stretch>
+                  <a:fillRect l="-1031" t="-1923" b="-17308"/>
+                </a:stretch>
+              </a:blipFill>
+              <a:ln>
+                <a:solidFill>
+                  <a:schemeClr val="tx1"/>
+                </a:solidFill>
+              </a:ln>
+            </p:spPr>
+            <p:txBody>
+              <a:bodyPr/>
+              <a:lstStyle/>
+              <a:p>
+                <a:r>
+                  <a:rPr lang="en-CA">
+                    <a:noFill/>
+                  </a:rPr>
+                  <a:t> </a:t>
+                </a:r>
+              </a:p>
+            </p:txBody>
+          </p:sp>
+        </mc:Fallback>
+      </mc:AlternateContent>
+      <p:cxnSp>
+        <p:nvCxnSpPr>
+          <p:cNvPr id="12" name="Straight Arrow Connector 11">
+            <a:extLst>
+              <a:ext uri="{FF2B5EF4-FFF2-40B4-BE49-F238E27FC236}">
+                <a16:creationId xmlns:a16="http://schemas.microsoft.com/office/drawing/2014/main" id="{E46030AB-8E1B-46A3-8EB6-3BFD27313F26}"/>
+              </a:ext>
+            </a:extLst>
+          </p:cNvPr>
+          <p:cNvCxnSpPr>
+            <a:cxnSpLocks/>
+            <a:stCxn id="4" idx="3"/>
+            <a:endCxn id="5" idx="1"/>
+          </p:cNvCxnSpPr>
+          <p:nvPr/>
+        </p:nvCxnSpPr>
+        <p:spPr>
+          <a:xfrm flipV="1">
+            <a:off x="1930481" y="1682890"/>
+            <a:ext cx="459081" cy="5933"/>
+          </a:xfrm>
+          <a:prstGeom prst="straightConnector1">
+            <a:avLst/>
+          </a:prstGeom>
+          <a:ln>
+            <a:solidFill>
+              <a:schemeClr val="tx1"/>
+            </a:solidFill>
+            <a:tailEnd type="triangle"/>
+          </a:ln>
+        </p:spPr>
+        <p:style>
+          <a:lnRef idx="1">
+            <a:schemeClr val="accent1"/>
+          </a:lnRef>
+          <a:fillRef idx="0">
+            <a:schemeClr val="accent1"/>
+          </a:fillRef>
+          <a:effectRef idx="0">
+            <a:schemeClr val="accent1"/>
+          </a:effectRef>
+          <a:fontRef idx="minor">
+            <a:schemeClr val="tx1"/>
+          </a:fontRef>
+        </p:style>
+      </p:cxnSp>
+      <p:cxnSp>
+        <p:nvCxnSpPr>
+          <p:cNvPr id="13" name="Straight Arrow Connector 12">
+            <a:extLst>
+              <a:ext uri="{FF2B5EF4-FFF2-40B4-BE49-F238E27FC236}">
+                <a16:creationId xmlns:a16="http://schemas.microsoft.com/office/drawing/2014/main" id="{161CE811-7C69-4AE0-B60C-CBF557E500B9}"/>
+              </a:ext>
+            </a:extLst>
+          </p:cNvPr>
+          <p:cNvCxnSpPr>
+            <a:cxnSpLocks/>
+            <a:stCxn id="5" idx="3"/>
+            <a:endCxn id="6" idx="1"/>
+          </p:cNvCxnSpPr>
+          <p:nvPr/>
+        </p:nvCxnSpPr>
+        <p:spPr>
+          <a:xfrm>
+            <a:off x="3286346" y="1682890"/>
+            <a:ext cx="524306" cy="0"/>
+          </a:xfrm>
+          <a:prstGeom prst="straightConnector1">
+            <a:avLst/>
+          </a:prstGeom>
+          <a:ln>
+            <a:tailEnd type="triangle"/>
+          </a:ln>
+        </p:spPr>
+        <p:style>
+          <a:lnRef idx="1">
+            <a:schemeClr val="dk1"/>
+          </a:lnRef>
+          <a:fillRef idx="0">
+            <a:schemeClr val="dk1"/>
+          </a:fillRef>
+          <a:effectRef idx="0">
+            <a:schemeClr val="dk1"/>
+          </a:effectRef>
+          <a:fontRef idx="minor">
+            <a:schemeClr val="tx1"/>
+          </a:fontRef>
+        </p:style>
+      </p:cxnSp>
+      <p:cxnSp>
+        <p:nvCxnSpPr>
+          <p:cNvPr id="15" name="Straight Arrow Connector 14">
+            <a:extLst>
+              <a:ext uri="{FF2B5EF4-FFF2-40B4-BE49-F238E27FC236}">
+                <a16:creationId xmlns:a16="http://schemas.microsoft.com/office/drawing/2014/main" id="{24D158D2-E4D3-479A-8FB4-1D0C4969A7B0}"/>
+              </a:ext>
+            </a:extLst>
+          </p:cNvPr>
+          <p:cNvCxnSpPr>
+            <a:cxnSpLocks/>
+            <a:stCxn id="6" idx="3"/>
+            <a:endCxn id="8" idx="1"/>
+          </p:cNvCxnSpPr>
+          <p:nvPr/>
+        </p:nvCxnSpPr>
+        <p:spPr>
+          <a:xfrm>
+            <a:off x="4418002" y="1682890"/>
+            <a:ext cx="527871" cy="5933"/>
+          </a:xfrm>
+          <a:prstGeom prst="straightConnector1">
+            <a:avLst/>
+          </a:prstGeom>
+          <a:ln>
+            <a:tailEnd type="triangle"/>
+          </a:ln>
+        </p:spPr>
+        <p:style>
+          <a:lnRef idx="1">
+            <a:schemeClr val="dk1"/>
+          </a:lnRef>
+          <a:fillRef idx="0">
+            <a:schemeClr val="dk1"/>
+          </a:fillRef>
+          <a:effectRef idx="0">
+            <a:schemeClr val="dk1"/>
+          </a:effectRef>
+          <a:fontRef idx="minor">
+            <a:schemeClr val="tx1"/>
+          </a:fontRef>
+        </p:style>
+      </p:cxnSp>
+      <p:cxnSp>
+        <p:nvCxnSpPr>
+          <p:cNvPr id="18" name="Straight Arrow Connector 17">
+            <a:extLst>
+              <a:ext uri="{FF2B5EF4-FFF2-40B4-BE49-F238E27FC236}">
+                <a16:creationId xmlns:a16="http://schemas.microsoft.com/office/drawing/2014/main" id="{E93E3692-A7EB-4D41-9096-3A2F00FDD15D}"/>
+              </a:ext>
+            </a:extLst>
+          </p:cNvPr>
+          <p:cNvCxnSpPr>
+            <a:cxnSpLocks/>
+            <a:stCxn id="8" idx="3"/>
+            <a:endCxn id="10" idx="1"/>
+          </p:cNvCxnSpPr>
+          <p:nvPr/>
+        </p:nvCxnSpPr>
+        <p:spPr>
+          <a:xfrm flipV="1">
+            <a:off x="5834258" y="1682890"/>
+            <a:ext cx="635043" cy="5933"/>
+          </a:xfrm>
+          <a:prstGeom prst="straightConnector1">
+            <a:avLst/>
+          </a:prstGeom>
+          <a:ln>
+            <a:tailEnd type="triangle"/>
+          </a:ln>
+        </p:spPr>
+        <p:style>
+          <a:lnRef idx="1">
+            <a:schemeClr val="dk1"/>
+          </a:lnRef>
+          <a:fillRef idx="0">
+            <a:schemeClr val="dk1"/>
+          </a:fillRef>
+          <a:effectRef idx="0">
+            <a:schemeClr val="dk1"/>
+          </a:effectRef>
+          <a:fontRef idx="minor">
+            <a:schemeClr val="tx1"/>
+          </a:fontRef>
+        </p:style>
+      </p:cxnSp>
+      <p:cxnSp>
+        <p:nvCxnSpPr>
+          <p:cNvPr id="48" name="Straight Connector 47">
+            <a:extLst>
+              <a:ext uri="{FF2B5EF4-FFF2-40B4-BE49-F238E27FC236}">
+                <a16:creationId xmlns:a16="http://schemas.microsoft.com/office/drawing/2014/main" id="{3B50B1CA-B7EB-4E9A-BEFE-908C0513C003}"/>
+              </a:ext>
+            </a:extLst>
+          </p:cNvPr>
+          <p:cNvCxnSpPr>
+            <a:cxnSpLocks/>
+          </p:cNvCxnSpPr>
+          <p:nvPr/>
+        </p:nvCxnSpPr>
+        <p:spPr>
+          <a:xfrm>
+            <a:off x="6282650" y="1682889"/>
+            <a:ext cx="0" cy="702092"/>
+          </a:xfrm>
+          <a:prstGeom prst="line">
+            <a:avLst/>
+          </a:prstGeom>
+        </p:spPr>
+        <p:style>
+          <a:lnRef idx="1">
+            <a:schemeClr val="dk1"/>
+          </a:lnRef>
+          <a:fillRef idx="0">
+            <a:schemeClr val="dk1"/>
+          </a:fillRef>
+          <a:effectRef idx="0">
+            <a:schemeClr val="dk1"/>
+          </a:effectRef>
+          <a:fontRef idx="minor">
+            <a:schemeClr val="tx1"/>
+          </a:fontRef>
+        </p:style>
+      </p:cxnSp>
+      <p:cxnSp>
+        <p:nvCxnSpPr>
+          <p:cNvPr id="50" name="Connector: Elbow 49">
+            <a:extLst>
+              <a:ext uri="{FF2B5EF4-FFF2-40B4-BE49-F238E27FC236}">
+                <a16:creationId xmlns:a16="http://schemas.microsoft.com/office/drawing/2014/main" id="{01330EB8-4D5B-4FF5-8F9C-C1CA679DC055}"/>
+              </a:ext>
+            </a:extLst>
+          </p:cNvPr>
+          <p:cNvCxnSpPr>
+            <a:cxnSpLocks/>
+            <a:endCxn id="5" idx="2"/>
+          </p:cNvCxnSpPr>
+          <p:nvPr/>
+        </p:nvCxnSpPr>
+        <p:spPr>
+          <a:xfrm rot="10800000">
+            <a:off x="2837954" y="1836779"/>
+            <a:ext cx="3444696" cy="548203"/>
+          </a:xfrm>
+          <a:prstGeom prst="bentConnector2">
+            <a:avLst/>
+          </a:prstGeom>
+          <a:ln>
+            <a:tailEnd type="triangle"/>
+          </a:ln>
+        </p:spPr>
+        <p:style>
+          <a:lnRef idx="1">
+            <a:schemeClr val="dk1"/>
+          </a:lnRef>
+          <a:fillRef idx="0">
+            <a:schemeClr val="dk1"/>
+          </a:fillRef>
+          <a:effectRef idx="0">
+            <a:schemeClr val="dk1"/>
+          </a:effectRef>
+          <a:fontRef idx="minor">
+            <a:schemeClr val="tx1"/>
+          </a:fontRef>
+        </p:style>
+      </p:cxnSp>
+    </p:spTree>
+    <p:extLst>
+      <p:ext uri="{BB962C8B-B14F-4D97-AF65-F5344CB8AC3E}">
+        <p14:creationId xmlns:p14="http://schemas.microsoft.com/office/powerpoint/2010/main" val="3276007680"/>
       </p:ext>
     </p:extLst>
   </p:cSld>

</xml_diff>